<commit_message>
Update project03 - 기능 정리 - 서희.pptx
</commit_message>
<xml_diff>
--- a/기능 정리/project03 - 기능 정리 - 서희.pptx
+++ b/기능 정리/project03 - 기능 정리 - 서희.pptx
@@ -107,6 +107,11 @@
       </a:defRPr>
     </a:lvl9pPr>
   </p:defaultTextStyle>
+  <p:extLst>
+    <p:ext uri="{EFAFB233-063F-42B5-8137-9DF3F51BA10A}">
+      <p15:sldGuideLst xmlns:p15="http://schemas.microsoft.com/office/powerpoint/2012/main"/>
+    </p:ext>
+  </p:extLst>
 </p:presentation>
 </file>
 
@@ -241,7 +246,7 @@
           <a:p>
             <a:fld id="{E0C64F5E-737F-4F6B-9F15-DAA8DB3BF429}" type="datetimeFigureOut">
               <a:rPr lang="ko-KR" altLang="en-US" smtClean="0"/>
-              <a:t>2020-01-31</a:t>
+              <a:t>2020-02-03</a:t>
             </a:fld>
             <a:endParaRPr lang="ko-KR" altLang="en-US"/>
           </a:p>
@@ -411,7 +416,7 @@
           <a:p>
             <a:fld id="{E0C64F5E-737F-4F6B-9F15-DAA8DB3BF429}" type="datetimeFigureOut">
               <a:rPr lang="ko-KR" altLang="en-US" smtClean="0"/>
-              <a:t>2020-01-31</a:t>
+              <a:t>2020-02-03</a:t>
             </a:fld>
             <a:endParaRPr lang="ko-KR" altLang="en-US"/>
           </a:p>
@@ -591,7 +596,7 @@
           <a:p>
             <a:fld id="{E0C64F5E-737F-4F6B-9F15-DAA8DB3BF429}" type="datetimeFigureOut">
               <a:rPr lang="ko-KR" altLang="en-US" smtClean="0"/>
-              <a:t>2020-01-31</a:t>
+              <a:t>2020-02-03</a:t>
             </a:fld>
             <a:endParaRPr lang="ko-KR" altLang="en-US"/>
           </a:p>
@@ -761,7 +766,7 @@
           <a:p>
             <a:fld id="{E0C64F5E-737F-4F6B-9F15-DAA8DB3BF429}" type="datetimeFigureOut">
               <a:rPr lang="ko-KR" altLang="en-US" smtClean="0"/>
-              <a:t>2020-01-31</a:t>
+              <a:t>2020-02-03</a:t>
             </a:fld>
             <a:endParaRPr lang="ko-KR" altLang="en-US"/>
           </a:p>
@@ -1007,7 +1012,7 @@
           <a:p>
             <a:fld id="{E0C64F5E-737F-4F6B-9F15-DAA8DB3BF429}" type="datetimeFigureOut">
               <a:rPr lang="ko-KR" altLang="en-US" smtClean="0"/>
-              <a:t>2020-01-31</a:t>
+              <a:t>2020-02-03</a:t>
             </a:fld>
             <a:endParaRPr lang="ko-KR" altLang="en-US"/>
           </a:p>
@@ -1239,7 +1244,7 @@
           <a:p>
             <a:fld id="{E0C64F5E-737F-4F6B-9F15-DAA8DB3BF429}" type="datetimeFigureOut">
               <a:rPr lang="ko-KR" altLang="en-US" smtClean="0"/>
-              <a:t>2020-01-31</a:t>
+              <a:t>2020-02-03</a:t>
             </a:fld>
             <a:endParaRPr lang="ko-KR" altLang="en-US"/>
           </a:p>
@@ -1606,7 +1611,7 @@
           <a:p>
             <a:fld id="{E0C64F5E-737F-4F6B-9F15-DAA8DB3BF429}" type="datetimeFigureOut">
               <a:rPr lang="ko-KR" altLang="en-US" smtClean="0"/>
-              <a:t>2020-01-31</a:t>
+              <a:t>2020-02-03</a:t>
             </a:fld>
             <a:endParaRPr lang="ko-KR" altLang="en-US"/>
           </a:p>
@@ -1724,7 +1729,7 @@
           <a:p>
             <a:fld id="{E0C64F5E-737F-4F6B-9F15-DAA8DB3BF429}" type="datetimeFigureOut">
               <a:rPr lang="ko-KR" altLang="en-US" smtClean="0"/>
-              <a:t>2020-01-31</a:t>
+              <a:t>2020-02-03</a:t>
             </a:fld>
             <a:endParaRPr lang="ko-KR" altLang="en-US"/>
           </a:p>
@@ -1819,7 +1824,7 @@
           <a:p>
             <a:fld id="{E0C64F5E-737F-4F6B-9F15-DAA8DB3BF429}" type="datetimeFigureOut">
               <a:rPr lang="ko-KR" altLang="en-US" smtClean="0"/>
-              <a:t>2020-01-31</a:t>
+              <a:t>2020-02-03</a:t>
             </a:fld>
             <a:endParaRPr lang="ko-KR" altLang="en-US"/>
           </a:p>
@@ -2096,7 +2101,7 @@
           <a:p>
             <a:fld id="{E0C64F5E-737F-4F6B-9F15-DAA8DB3BF429}" type="datetimeFigureOut">
               <a:rPr lang="ko-KR" altLang="en-US" smtClean="0"/>
-              <a:t>2020-01-31</a:t>
+              <a:t>2020-02-03</a:t>
             </a:fld>
             <a:endParaRPr lang="ko-KR" altLang="en-US"/>
           </a:p>
@@ -2349,7 +2354,7 @@
           <a:p>
             <a:fld id="{E0C64F5E-737F-4F6B-9F15-DAA8DB3BF429}" type="datetimeFigureOut">
               <a:rPr lang="ko-KR" altLang="en-US" smtClean="0"/>
-              <a:t>2020-01-31</a:t>
+              <a:t>2020-02-03</a:t>
             </a:fld>
             <a:endParaRPr lang="ko-KR" altLang="en-US"/>
           </a:p>
@@ -2562,7 +2567,7 @@
           <a:p>
             <a:fld id="{E0C64F5E-737F-4F6B-9F15-DAA8DB3BF429}" type="datetimeFigureOut">
               <a:rPr lang="ko-KR" altLang="en-US" smtClean="0"/>
-              <a:t>2020-01-31</a:t>
+              <a:t>2020-02-03</a:t>
             </a:fld>
             <a:endParaRPr lang="ko-KR" altLang="en-US"/>
           </a:p>
@@ -3078,10 +3083,216 @@
         </p:nvSpPr>
         <p:spPr/>
         <p:txBody>
-          <a:bodyPr/>
-          <a:lstStyle/>
-          <a:p>
-            <a:endParaRPr lang="ko-KR" altLang="en-US"/>
+          <a:bodyPr>
+            <a:normAutofit fontScale="55000" lnSpcReduction="20000"/>
+          </a:bodyPr>
+          <a:lstStyle/>
+          <a:p>
+            <a:r>
+              <a:rPr lang="ko-KR" altLang="en-US" dirty="0" smtClean="0"/>
+              <a:t>회원가입 </a:t>
+            </a:r>
+            <a:r>
+              <a:rPr lang="en-US" altLang="ko-KR" dirty="0" smtClean="0"/>
+              <a:t>(</a:t>
+            </a:r>
+            <a:r>
+              <a:rPr lang="ko-KR" altLang="en-US" dirty="0" err="1" smtClean="0"/>
+              <a:t>소셜</a:t>
+            </a:r>
+            <a:r>
+              <a:rPr lang="ko-KR" altLang="en-US" dirty="0" smtClean="0"/>
+              <a:t> 로그인</a:t>
+            </a:r>
+            <a:r>
+              <a:rPr lang="en-US" altLang="ko-KR" dirty="0" smtClean="0"/>
+              <a:t>)</a:t>
+            </a:r>
+          </a:p>
+          <a:p>
+            <a:r>
+              <a:rPr lang="ko-KR" altLang="en-US" dirty="0" smtClean="0"/>
+              <a:t>투자 회원 전환</a:t>
+            </a:r>
+            <a:endParaRPr lang="en-US" altLang="ko-KR" dirty="0" smtClean="0"/>
+          </a:p>
+          <a:p>
+            <a:r>
+              <a:rPr lang="ko-KR" altLang="en-US" dirty="0" smtClean="0"/>
+              <a:t>투자하기</a:t>
+            </a:r>
+            <a:endParaRPr lang="en-US" altLang="ko-KR" dirty="0" smtClean="0"/>
+          </a:p>
+          <a:p>
+            <a:r>
+              <a:rPr lang="ko-KR" altLang="en-US" dirty="0" smtClean="0"/>
+              <a:t>상품페이지</a:t>
+            </a:r>
+            <a:endParaRPr lang="en-US" altLang="ko-KR" dirty="0" smtClean="0"/>
+          </a:p>
+          <a:p>
+            <a:r>
+              <a:rPr lang="ko-KR" altLang="en-US" dirty="0" smtClean="0"/>
+              <a:t>나의 투자내역</a:t>
+            </a:r>
+            <a:endParaRPr lang="en-US" altLang="ko-KR" dirty="0" smtClean="0"/>
+          </a:p>
+          <a:p>
+            <a:r>
+              <a:rPr lang="ko-KR" altLang="en-US" dirty="0" smtClean="0"/>
+              <a:t>나의 증권계좌</a:t>
+            </a:r>
+            <a:r>
+              <a:rPr lang="en-US" altLang="ko-KR" dirty="0" smtClean="0"/>
+              <a:t>(</a:t>
+            </a:r>
+            <a:r>
+              <a:rPr lang="ko-KR" altLang="en-US" dirty="0" smtClean="0"/>
+              <a:t>외부 증권사</a:t>
+            </a:r>
+            <a:r>
+              <a:rPr lang="en-US" altLang="ko-KR" dirty="0" smtClean="0"/>
+              <a:t>, </a:t>
+            </a:r>
+            <a:r>
+              <a:rPr lang="ko-KR" altLang="en-US" dirty="0" smtClean="0"/>
+              <a:t>내부 보유 가능</a:t>
+            </a:r>
+            <a:r>
+              <a:rPr lang="en-US" altLang="ko-KR" dirty="0" smtClean="0"/>
+              <a:t>)</a:t>
+            </a:r>
+          </a:p>
+          <a:p>
+            <a:r>
+              <a:rPr lang="ko-KR" altLang="en-US" dirty="0" smtClean="0"/>
+              <a:t>예치금 입금</a:t>
+            </a:r>
+            <a:endParaRPr lang="en-US" altLang="ko-KR" dirty="0" smtClean="0"/>
+          </a:p>
+          <a:p>
+            <a:r>
+              <a:rPr lang="ko-KR" altLang="en-US" dirty="0" smtClean="0"/>
+              <a:t>예치금 내역</a:t>
+            </a:r>
+            <a:endParaRPr lang="en-US" altLang="ko-KR" dirty="0" smtClean="0"/>
+          </a:p>
+          <a:p>
+            <a:r>
+              <a:rPr lang="ko-KR" altLang="en-US" dirty="0" smtClean="0"/>
+              <a:t>예치금 출금</a:t>
+            </a:r>
+            <a:endParaRPr lang="en-US" altLang="ko-KR" dirty="0" smtClean="0"/>
+          </a:p>
+          <a:p>
+            <a:r>
+              <a:rPr lang="ko-KR" altLang="en-US" dirty="0" err="1" smtClean="0"/>
+              <a:t>펀딩</a:t>
+            </a:r>
+            <a:r>
+              <a:rPr lang="ko-KR" altLang="en-US" dirty="0" smtClean="0"/>
+              <a:t> 받기 </a:t>
+            </a:r>
+            <a:endParaRPr lang="en-US" altLang="ko-KR" dirty="0" smtClean="0"/>
+          </a:p>
+          <a:p>
+            <a:r>
+              <a:rPr lang="ko-KR" altLang="en-US" dirty="0" err="1" smtClean="0"/>
+              <a:t>펀딩</a:t>
+            </a:r>
+            <a:r>
+              <a:rPr lang="ko-KR" altLang="en-US" dirty="0" smtClean="0"/>
+              <a:t> 페이지 작성</a:t>
+            </a:r>
+            <a:endParaRPr lang="en-US" altLang="ko-KR" dirty="0" smtClean="0"/>
+          </a:p>
+          <a:p>
+            <a:r>
+              <a:rPr lang="ko-KR" altLang="en-US" dirty="0" err="1" smtClean="0"/>
+              <a:t>펀딩</a:t>
+            </a:r>
+            <a:r>
+              <a:rPr lang="ko-KR" altLang="en-US" dirty="0" smtClean="0"/>
+              <a:t> 목표 금액 설정</a:t>
+            </a:r>
+            <a:endParaRPr lang="en-US" altLang="ko-KR" dirty="0" smtClean="0"/>
+          </a:p>
+          <a:p>
+            <a:r>
+              <a:rPr lang="ko-KR" altLang="en-US" dirty="0" smtClean="0"/>
+              <a:t>완료된 </a:t>
+            </a:r>
+            <a:r>
+              <a:rPr lang="ko-KR" altLang="en-US" dirty="0" err="1" smtClean="0"/>
+              <a:t>펀딩</a:t>
+            </a:r>
+            <a:r>
+              <a:rPr lang="en-US" altLang="ko-KR" dirty="0" smtClean="0"/>
+              <a:t>, </a:t>
+            </a:r>
+            <a:r>
+              <a:rPr lang="ko-KR" altLang="en-US" dirty="0" err="1" smtClean="0"/>
+              <a:t>진행중</a:t>
+            </a:r>
+            <a:r>
+              <a:rPr lang="ko-KR" altLang="en-US" dirty="0" smtClean="0"/>
+              <a:t> </a:t>
+            </a:r>
+            <a:r>
+              <a:rPr lang="ko-KR" altLang="en-US" dirty="0" err="1" smtClean="0"/>
+              <a:t>펀딩</a:t>
+            </a:r>
+            <a:r>
+              <a:rPr lang="en-US" altLang="ko-KR" dirty="0" smtClean="0"/>
+              <a:t>, </a:t>
+            </a:r>
+            <a:r>
+              <a:rPr lang="ko-KR" altLang="en-US" dirty="0" smtClean="0"/>
+              <a:t>다가올 </a:t>
+            </a:r>
+            <a:r>
+              <a:rPr lang="ko-KR" altLang="en-US" dirty="0" err="1" smtClean="0"/>
+              <a:t>펀딩</a:t>
+            </a:r>
+            <a:r>
+              <a:rPr lang="ko-KR" altLang="en-US" dirty="0" smtClean="0"/>
+              <a:t> </a:t>
+            </a:r>
+            <a:r>
+              <a:rPr lang="ko-KR" altLang="en-US" dirty="0" err="1" smtClean="0"/>
+              <a:t>미리보기</a:t>
+            </a:r>
+            <a:endParaRPr lang="en-US" altLang="ko-KR" dirty="0" smtClean="0"/>
+          </a:p>
+          <a:p>
+            <a:r>
+              <a:rPr lang="ko-KR" altLang="en-US" dirty="0" err="1" smtClean="0"/>
+              <a:t>펀딩하는</a:t>
+            </a:r>
+            <a:r>
+              <a:rPr lang="ko-KR" altLang="en-US" dirty="0" smtClean="0"/>
+              <a:t> 법 안내</a:t>
+            </a:r>
+            <a:r>
+              <a:rPr lang="en-US" altLang="ko-KR" dirty="0" smtClean="0"/>
+              <a:t>(</a:t>
+            </a:r>
+            <a:r>
+              <a:rPr lang="ko-KR" altLang="en-US" dirty="0" smtClean="0"/>
+              <a:t>회사</a:t>
+            </a:r>
+            <a:r>
+              <a:rPr lang="en-US" altLang="ko-KR" dirty="0" smtClean="0"/>
+              <a:t>/</a:t>
+            </a:r>
+            <a:r>
+              <a:rPr lang="ko-KR" altLang="en-US" dirty="0" smtClean="0"/>
+              <a:t>투자자</a:t>
+            </a:r>
+            <a:r>
+              <a:rPr lang="en-US" altLang="ko-KR" dirty="0" smtClean="0"/>
+              <a:t>)</a:t>
+            </a:r>
           </a:p>
         </p:txBody>
       </p:sp>
@@ -3150,10 +3361,208 @@
         </p:nvSpPr>
         <p:spPr/>
         <p:txBody>
-          <a:bodyPr/>
-          <a:lstStyle/>
-          <a:p>
-            <a:endParaRPr lang="ko-KR" altLang="en-US"/>
+          <a:bodyPr>
+            <a:normAutofit lnSpcReduction="10000"/>
+          </a:bodyPr>
+          <a:lstStyle/>
+          <a:p>
+            <a:r>
+              <a:rPr lang="ko-KR" altLang="en-US" dirty="0" smtClean="0"/>
+              <a:t>회원 예치금 몰수</a:t>
+            </a:r>
+            <a:r>
+              <a:rPr lang="en-US" altLang="ko-KR" dirty="0" smtClean="0"/>
+              <a:t>, </a:t>
+            </a:r>
+            <a:r>
+              <a:rPr lang="ko-KR" altLang="en-US" dirty="0" smtClean="0"/>
+              <a:t>부여</a:t>
+            </a:r>
+            <a:r>
+              <a:rPr lang="en-US" altLang="ko-KR" dirty="0" smtClean="0"/>
+              <a:t>, </a:t>
+            </a:r>
+            <a:r>
+              <a:rPr lang="ko-KR" altLang="en-US" dirty="0" smtClean="0"/>
+              <a:t>입출금 및 투자내역 보기</a:t>
+            </a:r>
+            <a:endParaRPr lang="en-US" altLang="ko-KR" dirty="0" smtClean="0"/>
+          </a:p>
+          <a:p>
+            <a:r>
+              <a:rPr lang="ko-KR" altLang="en-US" dirty="0" smtClean="0"/>
+              <a:t>회원 강제 탈퇴</a:t>
+            </a:r>
+            <a:r>
+              <a:rPr lang="en-US" altLang="ko-KR" dirty="0" smtClean="0"/>
+              <a:t>, </a:t>
+            </a:r>
+            <a:r>
+              <a:rPr lang="ko-KR" altLang="en-US" dirty="0" smtClean="0"/>
+              <a:t>투자제한</a:t>
+            </a:r>
+            <a:r>
+              <a:rPr lang="en-US" altLang="ko-KR" dirty="0" smtClean="0"/>
+              <a:t>, </a:t>
+            </a:r>
+            <a:r>
+              <a:rPr lang="ko-KR" altLang="en-US" dirty="0" err="1" smtClean="0"/>
+              <a:t>펀딩</a:t>
+            </a:r>
+            <a:r>
+              <a:rPr lang="ko-KR" altLang="en-US" dirty="0" smtClean="0"/>
+              <a:t> 페이지 열기 제한 걸기</a:t>
+            </a:r>
+            <a:endParaRPr lang="en-US" altLang="ko-KR" dirty="0" smtClean="0"/>
+          </a:p>
+          <a:p>
+            <a:r>
+              <a:rPr lang="ko-KR" altLang="en-US" dirty="0" smtClean="0"/>
+              <a:t>일반회원</a:t>
+            </a:r>
+            <a:r>
+              <a:rPr lang="en-US" altLang="ko-KR" dirty="0" smtClean="0"/>
+              <a:t>, </a:t>
+            </a:r>
+            <a:r>
+              <a:rPr lang="ko-KR" altLang="en-US" dirty="0" smtClean="0"/>
+              <a:t>투자 회원</a:t>
+            </a:r>
+            <a:r>
+              <a:rPr lang="en-US" altLang="ko-KR" dirty="0" smtClean="0"/>
+              <a:t>, </a:t>
+            </a:r>
+            <a:r>
+              <a:rPr lang="ko-KR" altLang="en-US" dirty="0" smtClean="0"/>
+              <a:t>법인투자회원</a:t>
+            </a:r>
+            <a:r>
+              <a:rPr lang="en-US" altLang="ko-KR" dirty="0" smtClean="0"/>
+              <a:t>, </a:t>
+            </a:r>
+            <a:r>
+              <a:rPr lang="ko-KR" altLang="en-US" dirty="0" err="1" smtClean="0"/>
+              <a:t>법인펀딩회원</a:t>
+            </a:r>
+            <a:r>
+              <a:rPr lang="ko-KR" altLang="en-US" dirty="0" smtClean="0"/>
+              <a:t> 등급 관리</a:t>
+            </a:r>
+            <a:endParaRPr lang="en-US" altLang="ko-KR" dirty="0" smtClean="0"/>
+          </a:p>
+          <a:p>
+            <a:r>
+              <a:rPr lang="ko-KR" altLang="en-US" dirty="0" smtClean="0"/>
+              <a:t>상품 소개 페이지 수정</a:t>
+            </a:r>
+            <a:r>
+              <a:rPr lang="en-US" altLang="ko-KR" dirty="0" smtClean="0"/>
+              <a:t>, </a:t>
+            </a:r>
+            <a:r>
+              <a:rPr lang="ko-KR" altLang="en-US" dirty="0" smtClean="0"/>
+              <a:t>저장 기능</a:t>
+            </a:r>
+            <a:endParaRPr lang="en-US" altLang="ko-KR" dirty="0" smtClean="0"/>
+          </a:p>
+          <a:p>
+            <a:r>
+              <a:rPr lang="ko-KR" altLang="en-US" dirty="0" smtClean="0"/>
+              <a:t>상품 </a:t>
+            </a:r>
+            <a:r>
+              <a:rPr lang="ko-KR" altLang="en-US" dirty="0" err="1" smtClean="0"/>
+              <a:t>펀딩</a:t>
+            </a:r>
+            <a:r>
+              <a:rPr lang="ko-KR" altLang="en-US" dirty="0"/>
+              <a:t> </a:t>
+            </a:r>
+            <a:r>
+              <a:rPr lang="ko-KR" altLang="en-US" dirty="0" smtClean="0"/>
+              <a:t>상태 관리</a:t>
+            </a:r>
+            <a:r>
+              <a:rPr lang="en-US" altLang="ko-KR" dirty="0" smtClean="0"/>
+              <a:t>(</a:t>
+            </a:r>
+            <a:r>
+              <a:rPr lang="ko-KR" altLang="en-US" dirty="0" err="1" smtClean="0"/>
+              <a:t>진행중</a:t>
+            </a:r>
+            <a:r>
+              <a:rPr lang="en-US" altLang="ko-KR" dirty="0" smtClean="0"/>
+              <a:t>, </a:t>
+            </a:r>
+            <a:r>
+              <a:rPr lang="ko-KR" altLang="en-US" dirty="0" smtClean="0"/>
+              <a:t>완료</a:t>
+            </a:r>
+            <a:r>
+              <a:rPr lang="en-US" altLang="ko-KR" dirty="0" smtClean="0"/>
+              <a:t>, </a:t>
+            </a:r>
+            <a:r>
+              <a:rPr lang="ko-KR" altLang="en-US" dirty="0" smtClean="0"/>
+              <a:t>다가올 </a:t>
+            </a:r>
+            <a:r>
+              <a:rPr lang="ko-KR" altLang="en-US" dirty="0" err="1" smtClean="0"/>
+              <a:t>펀딩</a:t>
+            </a:r>
+            <a:r>
+              <a:rPr lang="en-US" altLang="ko-KR" dirty="0" smtClean="0"/>
+              <a:t>), </a:t>
+            </a:r>
+            <a:r>
+              <a:rPr lang="ko-KR" altLang="en-US" dirty="0" smtClean="0"/>
+              <a:t>기간이 지나면 자동으로 </a:t>
+            </a:r>
+            <a:r>
+              <a:rPr lang="ko-KR" altLang="en-US" dirty="0" err="1" smtClean="0"/>
+              <a:t>변경될수있도록</a:t>
+            </a:r>
+            <a:endParaRPr lang="en-US" altLang="ko-KR" dirty="0" smtClean="0"/>
+          </a:p>
+          <a:p>
+            <a:r>
+              <a:rPr lang="ko-KR" altLang="en-US" dirty="0" smtClean="0"/>
+              <a:t>이벤트</a:t>
+            </a:r>
+            <a:r>
+              <a:rPr lang="en-US" altLang="ko-KR" dirty="0" smtClean="0"/>
+              <a:t>, </a:t>
+            </a:r>
+            <a:r>
+              <a:rPr lang="ko-KR" altLang="en-US" dirty="0" smtClean="0"/>
+              <a:t>공지사항</a:t>
+            </a:r>
+            <a:r>
+              <a:rPr lang="en-US" altLang="ko-KR" dirty="0" smtClean="0"/>
+              <a:t>, FAQ </a:t>
+            </a:r>
+            <a:r>
+              <a:rPr lang="ko-KR" altLang="en-US" dirty="0" smtClean="0"/>
+              <a:t>편집</a:t>
+            </a:r>
+            <a:endParaRPr lang="en-US" altLang="ko-KR" dirty="0" smtClean="0"/>
+          </a:p>
+          <a:p>
+            <a:r>
+              <a:rPr lang="ko-KR" altLang="en-US" dirty="0" smtClean="0"/>
+              <a:t>실시간 채팅 답변</a:t>
+            </a:r>
+            <a:endParaRPr lang="en-US" altLang="ko-KR" dirty="0" smtClean="0"/>
+          </a:p>
+          <a:p>
+            <a:r>
+              <a:rPr lang="ko-KR" altLang="en-US" dirty="0" smtClean="0"/>
+              <a:t>팝업 관리</a:t>
+            </a:r>
+            <a:endParaRPr lang="en-US" altLang="ko-KR" dirty="0" smtClean="0"/>
+          </a:p>
+          <a:p>
+            <a:endParaRPr lang="en-US" altLang="ko-KR" dirty="0"/>
           </a:p>
         </p:txBody>
       </p:sp>
@@ -3240,7 +3649,43 @@
           <a:bodyPr/>
           <a:lstStyle/>
           <a:p>
-            <a:endParaRPr lang="ko-KR" altLang="en-US"/>
+            <a:pPr marL="0" indent="0">
+              <a:buNone/>
+            </a:pPr>
+            <a:r>
+              <a:rPr lang="ko-KR" altLang="en-US" dirty="0" smtClean="0"/>
+              <a:t>회원간 증권 거래 게시판</a:t>
+            </a:r>
+            <a:r>
+              <a:rPr lang="en-US" altLang="ko-KR" dirty="0" smtClean="0"/>
+              <a:t>????(</a:t>
+            </a:r>
+            <a:r>
+              <a:rPr lang="ko-KR" altLang="en-US" dirty="0" smtClean="0"/>
+              <a:t>아이템 </a:t>
+            </a:r>
+            <a:r>
+              <a:rPr lang="ko-KR" altLang="en-US" dirty="0" err="1" smtClean="0"/>
+              <a:t>매니아</a:t>
+            </a:r>
+            <a:r>
+              <a:rPr lang="ko-KR" altLang="en-US" dirty="0"/>
+              <a:t> </a:t>
+            </a:r>
+            <a:r>
+              <a:rPr lang="ko-KR" altLang="en-US" dirty="0" smtClean="0"/>
+              <a:t>방식</a:t>
+            </a:r>
+            <a:r>
+              <a:rPr lang="en-US" altLang="ko-KR" dirty="0" smtClean="0"/>
+              <a:t>)</a:t>
+            </a:r>
+          </a:p>
+          <a:p>
+            <a:pPr marL="0" indent="0">
+              <a:buNone/>
+            </a:pPr>
+            <a:endParaRPr lang="en-US" altLang="ko-KR" dirty="0" smtClean="0"/>
           </a:p>
         </p:txBody>
       </p:sp>

</xml_diff>